<commit_message>
New import / export functions
You can now export your password and import it in one of two ways: - add the imported categories to the current categories or replace the current categories with the new categories.
</commit_message>
<xml_diff>
--- a/icons/icon.pptx
+++ b/icons/icon.pptx
@@ -8,6 +8,7 @@
     <p:sldId id="258" r:id="rId2"/>
     <p:sldId id="259" r:id="rId3"/>
     <p:sldId id="260" r:id="rId4"/>
+    <p:sldId id="261" r:id="rId5"/>
   </p:sldIdLst>
   <p:sldSz cx="12192000" cy="6858000"/>
   <p:notesSz cx="6858000" cy="9144000"/>
@@ -261,7 +262,7 @@
           <a:p>
             <a:fld id="{7396A102-80D0-4776-AE43-4B1907A982CD}" type="datetimeFigureOut">
               <a:rPr lang="fr-FR" smtClean="0"/>
-              <a:t>19/03/2023</a:t>
+              <a:t>23/08/2023</a:t>
             </a:fld>
             <a:endParaRPr lang="fr-FR"/>
           </a:p>
@@ -459,7 +460,7 @@
           <a:p>
             <a:fld id="{7396A102-80D0-4776-AE43-4B1907A982CD}" type="datetimeFigureOut">
               <a:rPr lang="fr-FR" smtClean="0"/>
-              <a:t>19/03/2023</a:t>
+              <a:t>23/08/2023</a:t>
             </a:fld>
             <a:endParaRPr lang="fr-FR"/>
           </a:p>
@@ -667,7 +668,7 @@
           <a:p>
             <a:fld id="{7396A102-80D0-4776-AE43-4B1907A982CD}" type="datetimeFigureOut">
               <a:rPr lang="fr-FR" smtClean="0"/>
-              <a:t>19/03/2023</a:t>
+              <a:t>23/08/2023</a:t>
             </a:fld>
             <a:endParaRPr lang="fr-FR"/>
           </a:p>
@@ -865,7 +866,7 @@
           <a:p>
             <a:fld id="{7396A102-80D0-4776-AE43-4B1907A982CD}" type="datetimeFigureOut">
               <a:rPr lang="fr-FR" smtClean="0"/>
-              <a:t>19/03/2023</a:t>
+              <a:t>23/08/2023</a:t>
             </a:fld>
             <a:endParaRPr lang="fr-FR"/>
           </a:p>
@@ -1140,7 +1141,7 @@
           <a:p>
             <a:fld id="{7396A102-80D0-4776-AE43-4B1907A982CD}" type="datetimeFigureOut">
               <a:rPr lang="fr-FR" smtClean="0"/>
-              <a:t>19/03/2023</a:t>
+              <a:t>23/08/2023</a:t>
             </a:fld>
             <a:endParaRPr lang="fr-FR"/>
           </a:p>
@@ -1405,7 +1406,7 @@
           <a:p>
             <a:fld id="{7396A102-80D0-4776-AE43-4B1907A982CD}" type="datetimeFigureOut">
               <a:rPr lang="fr-FR" smtClean="0"/>
-              <a:t>19/03/2023</a:t>
+              <a:t>23/08/2023</a:t>
             </a:fld>
             <a:endParaRPr lang="fr-FR"/>
           </a:p>
@@ -1817,7 +1818,7 @@
           <a:p>
             <a:fld id="{7396A102-80D0-4776-AE43-4B1907A982CD}" type="datetimeFigureOut">
               <a:rPr lang="fr-FR" smtClean="0"/>
-              <a:t>19/03/2023</a:t>
+              <a:t>23/08/2023</a:t>
             </a:fld>
             <a:endParaRPr lang="fr-FR"/>
           </a:p>
@@ -1958,7 +1959,7 @@
           <a:p>
             <a:fld id="{7396A102-80D0-4776-AE43-4B1907A982CD}" type="datetimeFigureOut">
               <a:rPr lang="fr-FR" smtClean="0"/>
-              <a:t>19/03/2023</a:t>
+              <a:t>23/08/2023</a:t>
             </a:fld>
             <a:endParaRPr lang="fr-FR"/>
           </a:p>
@@ -2071,7 +2072,7 @@
           <a:p>
             <a:fld id="{7396A102-80D0-4776-AE43-4B1907A982CD}" type="datetimeFigureOut">
               <a:rPr lang="fr-FR" smtClean="0"/>
-              <a:t>19/03/2023</a:t>
+              <a:t>23/08/2023</a:t>
             </a:fld>
             <a:endParaRPr lang="fr-FR"/>
           </a:p>
@@ -2382,7 +2383,7 @@
           <a:p>
             <a:fld id="{7396A102-80D0-4776-AE43-4B1907A982CD}" type="datetimeFigureOut">
               <a:rPr lang="fr-FR" smtClean="0"/>
-              <a:t>19/03/2023</a:t>
+              <a:t>23/08/2023</a:t>
             </a:fld>
             <a:endParaRPr lang="fr-FR"/>
           </a:p>
@@ -2670,7 +2671,7 @@
           <a:p>
             <a:fld id="{7396A102-80D0-4776-AE43-4B1907A982CD}" type="datetimeFigureOut">
               <a:rPr lang="fr-FR" smtClean="0"/>
-              <a:t>19/03/2023</a:t>
+              <a:t>23/08/2023</a:t>
             </a:fld>
             <a:endParaRPr lang="fr-FR"/>
           </a:p>
@@ -2911,7 +2912,7 @@
           <a:p>
             <a:fld id="{7396A102-80D0-4776-AE43-4B1907A982CD}" type="datetimeFigureOut">
               <a:rPr lang="fr-FR" smtClean="0"/>
-              <a:t>19/03/2023</a:t>
+              <a:t>23/08/2023</a:t>
             </a:fld>
             <a:endParaRPr lang="fr-FR"/>
           </a:p>
@@ -4713,6 +4714,302 @@
 </p:sld>
 </file>
 
+<file path=ppt/slides/slide4.xml><?xml version="1.0" encoding="utf-8"?>
+<p:sld xmlns:a="http://schemas.openxmlformats.org/drawingml/2006/main" xmlns:r="http://schemas.openxmlformats.org/officeDocument/2006/relationships" xmlns:p="http://schemas.openxmlformats.org/presentationml/2006/main">
+  <p:cSld>
+    <p:spTree>
+      <p:nvGrpSpPr>
+        <p:cNvPr id="1" name=""/>
+        <p:cNvGrpSpPr/>
+        <p:nvPr/>
+      </p:nvGrpSpPr>
+      <p:grpSpPr>
+        <a:xfrm>
+          <a:off x="0" y="0"/>
+          <a:ext cx="0" cy="0"/>
+          <a:chOff x="0" y="0"/>
+          <a:chExt cx="0" cy="0"/>
+        </a:xfrm>
+      </p:grpSpPr>
+      <p:sp>
+        <p:nvSpPr>
+          <p:cNvPr id="2" name="Titre 1">
+            <a:extLst>
+              <a:ext uri="{FF2B5EF4-FFF2-40B4-BE49-F238E27FC236}">
+                <a16:creationId xmlns:a16="http://schemas.microsoft.com/office/drawing/2014/main" id="{544719E9-E936-2A83-7F86-3E93B11E33D2}"/>
+              </a:ext>
+            </a:extLst>
+          </p:cNvPr>
+          <p:cNvSpPr>
+            <a:spLocks noGrp="1"/>
+          </p:cNvSpPr>
+          <p:nvPr>
+            <p:ph type="title"/>
+          </p:nvPr>
+        </p:nvSpPr>
+        <p:spPr/>
+        <p:txBody>
+          <a:bodyPr/>
+          <a:lstStyle/>
+          <a:p>
+            <a:pPr algn="ctr"/>
+            <a:r>
+              <a:rPr lang="fr-FR" dirty="0"/>
+              <a:t>Ok and not ok </a:t>
+            </a:r>
+            <a:r>
+              <a:rPr lang="fr-FR" dirty="0" err="1"/>
+              <a:t>icons</a:t>
+            </a:r>
+            <a:endParaRPr lang="fr-FR" dirty="0"/>
+          </a:p>
+        </p:txBody>
+      </p:sp>
+      <p:sp>
+        <p:nvSpPr>
+          <p:cNvPr id="23" name="Bande diagonale 22">
+            <a:extLst>
+              <a:ext uri="{FF2B5EF4-FFF2-40B4-BE49-F238E27FC236}">
+                <a16:creationId xmlns:a16="http://schemas.microsoft.com/office/drawing/2014/main" id="{FE7ACE76-6C6D-5F4F-7B92-BDC495C5B775}"/>
+              </a:ext>
+            </a:extLst>
+          </p:cNvPr>
+          <p:cNvSpPr/>
+          <p:nvPr/>
+        </p:nvSpPr>
+        <p:spPr>
+          <a:xfrm>
+            <a:off x="1673525" y="3140015"/>
+            <a:ext cx="1061049" cy="1500996"/>
+          </a:xfrm>
+          <a:prstGeom prst="diagStripe">
+            <a:avLst>
+              <a:gd name="adj" fmla="val 74138"/>
+            </a:avLst>
+          </a:prstGeom>
+          <a:solidFill>
+            <a:schemeClr val="accent6"/>
+          </a:solidFill>
+          <a:ln>
+            <a:noFill/>
+          </a:ln>
+        </p:spPr>
+        <p:style>
+          <a:lnRef idx="2">
+            <a:schemeClr val="accent1">
+              <a:shade val="15000"/>
+            </a:schemeClr>
+          </a:lnRef>
+          <a:fillRef idx="1">
+            <a:schemeClr val="accent1"/>
+          </a:fillRef>
+          <a:effectRef idx="0">
+            <a:schemeClr val="accent1"/>
+          </a:effectRef>
+          <a:fontRef idx="minor">
+            <a:schemeClr val="lt1"/>
+          </a:fontRef>
+        </p:style>
+        <p:txBody>
+          <a:bodyPr rtlCol="0" anchor="ctr"/>
+          <a:lstStyle/>
+          <a:p>
+            <a:pPr algn="ctr"/>
+            <a:endParaRPr lang="fr-FR">
+              <a:solidFill>
+                <a:schemeClr val="tx1"/>
+              </a:solidFill>
+            </a:endParaRPr>
+          </a:p>
+        </p:txBody>
+      </p:sp>
+      <p:sp>
+        <p:nvSpPr>
+          <p:cNvPr id="24" name="Bande diagonale 23">
+            <a:extLst>
+              <a:ext uri="{FF2B5EF4-FFF2-40B4-BE49-F238E27FC236}">
+                <a16:creationId xmlns:a16="http://schemas.microsoft.com/office/drawing/2014/main" id="{64765B83-8634-CCE7-EF22-40784BE62D59}"/>
+              </a:ext>
+            </a:extLst>
+          </p:cNvPr>
+          <p:cNvSpPr/>
+          <p:nvPr/>
+        </p:nvSpPr>
+        <p:spPr>
+          <a:xfrm flipH="1">
+            <a:off x="1069675" y="3562708"/>
+            <a:ext cx="603850" cy="1078303"/>
+          </a:xfrm>
+          <a:prstGeom prst="diagStripe">
+            <a:avLst>
+              <a:gd name="adj" fmla="val 64538"/>
+            </a:avLst>
+          </a:prstGeom>
+          <a:solidFill>
+            <a:schemeClr val="accent6"/>
+          </a:solidFill>
+          <a:ln>
+            <a:noFill/>
+          </a:ln>
+        </p:spPr>
+        <p:style>
+          <a:lnRef idx="2">
+            <a:schemeClr val="accent1">
+              <a:shade val="15000"/>
+            </a:schemeClr>
+          </a:lnRef>
+          <a:fillRef idx="1">
+            <a:schemeClr val="accent1"/>
+          </a:fillRef>
+          <a:effectRef idx="0">
+            <a:schemeClr val="accent1"/>
+          </a:effectRef>
+          <a:fontRef idx="minor">
+            <a:schemeClr val="lt1"/>
+          </a:fontRef>
+        </p:style>
+        <p:txBody>
+          <a:bodyPr rtlCol="0" anchor="ctr"/>
+          <a:lstStyle/>
+          <a:p>
+            <a:pPr algn="ctr"/>
+            <a:endParaRPr lang="fr-FR">
+              <a:solidFill>
+                <a:schemeClr val="tx1"/>
+              </a:solidFill>
+            </a:endParaRPr>
+          </a:p>
+        </p:txBody>
+      </p:sp>
+      <p:sp>
+        <p:nvSpPr>
+          <p:cNvPr id="26" name="Bande diagonale 25">
+            <a:extLst>
+              <a:ext uri="{FF2B5EF4-FFF2-40B4-BE49-F238E27FC236}">
+                <a16:creationId xmlns:a16="http://schemas.microsoft.com/office/drawing/2014/main" id="{71467AA5-B80E-091A-306C-7991598EF3F0}"/>
+              </a:ext>
+            </a:extLst>
+          </p:cNvPr>
+          <p:cNvSpPr/>
+          <p:nvPr/>
+        </p:nvSpPr>
+        <p:spPr>
+          <a:xfrm>
+            <a:off x="9555192" y="3140015"/>
+            <a:ext cx="1061049" cy="1500996"/>
+          </a:xfrm>
+          <a:prstGeom prst="diagStripe">
+            <a:avLst>
+              <a:gd name="adj" fmla="val 74138"/>
+            </a:avLst>
+          </a:prstGeom>
+          <a:solidFill>
+            <a:srgbClr val="DA472E"/>
+          </a:solidFill>
+          <a:ln>
+            <a:noFill/>
+          </a:ln>
+        </p:spPr>
+        <p:style>
+          <a:lnRef idx="2">
+            <a:schemeClr val="accent1">
+              <a:shade val="15000"/>
+            </a:schemeClr>
+          </a:lnRef>
+          <a:fillRef idx="1">
+            <a:schemeClr val="accent1"/>
+          </a:fillRef>
+          <a:effectRef idx="0">
+            <a:schemeClr val="accent1"/>
+          </a:effectRef>
+          <a:fontRef idx="minor">
+            <a:schemeClr val="lt1"/>
+          </a:fontRef>
+        </p:style>
+        <p:txBody>
+          <a:bodyPr rtlCol="0" anchor="ctr"/>
+          <a:lstStyle/>
+          <a:p>
+            <a:pPr algn="ctr"/>
+            <a:endParaRPr lang="fr-FR">
+              <a:solidFill>
+                <a:schemeClr val="tx1"/>
+              </a:solidFill>
+            </a:endParaRPr>
+          </a:p>
+        </p:txBody>
+      </p:sp>
+      <p:sp>
+        <p:nvSpPr>
+          <p:cNvPr id="27" name="Bande diagonale 26">
+            <a:extLst>
+              <a:ext uri="{FF2B5EF4-FFF2-40B4-BE49-F238E27FC236}">
+                <a16:creationId xmlns:a16="http://schemas.microsoft.com/office/drawing/2014/main" id="{F872FE31-58D9-1027-C3D2-569AF7C6C452}"/>
+              </a:ext>
+            </a:extLst>
+          </p:cNvPr>
+          <p:cNvSpPr/>
+          <p:nvPr/>
+        </p:nvSpPr>
+        <p:spPr>
+          <a:xfrm flipH="1">
+            <a:off x="9555191" y="3140015"/>
+            <a:ext cx="1061049" cy="1500996"/>
+          </a:xfrm>
+          <a:prstGeom prst="diagStripe">
+            <a:avLst>
+              <a:gd name="adj" fmla="val 74138"/>
+            </a:avLst>
+          </a:prstGeom>
+          <a:solidFill>
+            <a:srgbClr val="DA472E"/>
+          </a:solidFill>
+          <a:ln>
+            <a:noFill/>
+          </a:ln>
+        </p:spPr>
+        <p:style>
+          <a:lnRef idx="2">
+            <a:schemeClr val="accent1">
+              <a:shade val="15000"/>
+            </a:schemeClr>
+          </a:lnRef>
+          <a:fillRef idx="1">
+            <a:schemeClr val="accent1"/>
+          </a:fillRef>
+          <a:effectRef idx="0">
+            <a:schemeClr val="accent1"/>
+          </a:effectRef>
+          <a:fontRef idx="minor">
+            <a:schemeClr val="lt1"/>
+          </a:fontRef>
+        </p:style>
+        <p:txBody>
+          <a:bodyPr rtlCol="0" anchor="ctr"/>
+          <a:lstStyle/>
+          <a:p>
+            <a:pPr algn="ctr"/>
+            <a:endParaRPr lang="fr-FR">
+              <a:solidFill>
+                <a:schemeClr val="tx1"/>
+              </a:solidFill>
+            </a:endParaRPr>
+          </a:p>
+        </p:txBody>
+      </p:sp>
+    </p:spTree>
+    <p:extLst>
+      <p:ext uri="{BB962C8B-B14F-4D97-AF65-F5344CB8AC3E}">
+        <p14:creationId xmlns:p14="http://schemas.microsoft.com/office/powerpoint/2010/main" val="514615603"/>
+      </p:ext>
+    </p:extLst>
+  </p:cSld>
+  <p:clrMapOvr>
+    <a:masterClrMapping/>
+  </p:clrMapOvr>
+</p:sld>
+</file>
+
 <file path=ppt/theme/theme1.xml><?xml version="1.0" encoding="utf-8"?>
 <a:theme xmlns:a="http://schemas.openxmlformats.org/drawingml/2006/main" name="Thème Office">
   <a:themeElements>

</xml_diff>